<commit_message>
updated lecture 1 for clarity on group work
</commit_message>
<xml_diff>
--- a/2026/lectures/01-intro.pptx
+++ b/2026/lectures/01-intro.pptx
@@ -9249,7 +9249,7 @@
         </p:spPr>
         <p:txBody>
           <a:bodyPr>
-            <a:normAutofit fontScale="92500" lnSpcReduction="20000"/>
+            <a:normAutofit fontScale="85000" lnSpcReduction="20000"/>
           </a:bodyPr>
           <a:lstStyle/>
           <a:p>
@@ -9287,6 +9287,13 @@
             <a:r>
               <a:rPr lang="en-US" sz="2000" dirty="0"/>
               <a:t>Learn to use new tools in the process</a:t>
+            </a:r>
+          </a:p>
+          <a:p>
+            <a:pPr lvl="1"/>
+            <a:r>
+              <a:rPr lang="en-US" sz="2000" dirty="0"/>
+              <a:t>May work with a partner</a:t>
             </a:r>
           </a:p>
           <a:p>
@@ -9411,7 +9418,7 @@
             </a:pPr>
             <a:r>
               <a:rPr lang="en-US" sz="2400" dirty="0"/>
-              <a:t>Complete the labs independently!</a:t>
+              <a:t>How to work with course staff when completing the labs</a:t>
             </a:r>
           </a:p>
           <a:p>
@@ -9425,7 +9432,7 @@
             <a:pPr lvl="1"/>
             <a:r>
               <a:rPr lang="en-US" sz="2000" dirty="0"/>
-              <a:t>We wont help with: debugging code, proposing an approach</a:t>
+              <a:t>We won’t help with: debugging code, proposing an approach</a:t>
             </a:r>
           </a:p>
           <a:p>

</xml_diff>